<commit_message>
Update analysis to Time and Exposure
</commit_message>
<xml_diff>
--- a/Presentation/RoL_HeaterTrial2021.pptx
+++ b/Presentation/RoL_HeaterTrial2021.pptx
@@ -5,16 +5,26 @@
     <p:sldMasterId id="2147483648" r:id="rId1"/>
   </p:sldMasterIdLst>
   <p:notesMasterIdLst>
-    <p:notesMasterId r:id="rId9"/>
+    <p:notesMasterId r:id="rId19"/>
   </p:notesMasterIdLst>
   <p:sldIdLst>
     <p:sldId id="306" r:id="rId2"/>
-    <p:sldId id="415" r:id="rId3"/>
+    <p:sldId id="416" r:id="rId3"/>
     <p:sldId id="414" r:id="rId4"/>
     <p:sldId id="307" r:id="rId5"/>
     <p:sldId id="309" r:id="rId6"/>
     <p:sldId id="310" r:id="rId7"/>
-    <p:sldId id="311" r:id="rId8"/>
+    <p:sldId id="417" r:id="rId8"/>
+    <p:sldId id="418" r:id="rId9"/>
+    <p:sldId id="419" r:id="rId10"/>
+    <p:sldId id="420" r:id="rId11"/>
+    <p:sldId id="421" r:id="rId12"/>
+    <p:sldId id="422" r:id="rId13"/>
+    <p:sldId id="423" r:id="rId14"/>
+    <p:sldId id="424" r:id="rId15"/>
+    <p:sldId id="425" r:id="rId16"/>
+    <p:sldId id="426" r:id="rId17"/>
+    <p:sldId id="427" r:id="rId18"/>
   </p:sldIdLst>
   <p:sldSz cx="12192000" cy="6858000"/>
   <p:notesSz cx="6858000" cy="9144000"/>
@@ -131,20 +141,6 @@
     </p:extLst>
   </p:cmAuthor>
 </p:cmAuthorLst>
-</file>
-
-<file path=ppt/comments/comment1.xml><?xml version="1.0" encoding="utf-8"?>
-<p:cmLst xmlns:a="http://schemas.openxmlformats.org/drawingml/2006/main" xmlns:r="http://schemas.openxmlformats.org/officeDocument/2006/relationships" xmlns:p="http://schemas.openxmlformats.org/presentationml/2006/main">
-  <p:cm authorId="1" dt="2021-09-07T11:37:48.683" idx="1">
-    <p:pos x="10" y="10"/>
-    <p:text>Add a graphical abstract of project here</p:text>
-    <p:extLst>
-      <p:ext uri="{C676402C-5697-4E1C-873F-D02D1690AC5C}">
-        <p15:threadingInfo xmlns:p15="http://schemas.microsoft.com/office/powerpoint/2012/main" timeZoneBias="420"/>
-      </p:ext>
-    </p:extLst>
-  </p:cm>
-</p:cmLst>
 </file>
 
 <file path=ppt/notesMasters/notesMaster1.xml><?xml version="1.0" encoding="utf-8"?>
@@ -742,6 +738,264 @@
     <p:extLst>
       <p:ext uri="{BB962C8B-B14F-4D97-AF65-F5344CB8AC3E}">
         <p14:creationId xmlns:p14="http://schemas.microsoft.com/office/powerpoint/2010/main" val="1503679562"/>
+      </p:ext>
+    </p:extLst>
+  </p:cSld>
+  <p:clrMapOvr>
+    <a:masterClrMapping/>
+  </p:clrMapOvr>
+</p:notes>
+</file>
+
+<file path=ppt/notesSlides/notesSlide4.xml><?xml version="1.0" encoding="utf-8"?>
+<p:notes xmlns:a="http://schemas.openxmlformats.org/drawingml/2006/main" xmlns:r="http://schemas.openxmlformats.org/officeDocument/2006/relationships" xmlns:p="http://schemas.openxmlformats.org/presentationml/2006/main">
+  <p:cSld>
+    <p:spTree>
+      <p:nvGrpSpPr>
+        <p:cNvPr id="1" name=""/>
+        <p:cNvGrpSpPr/>
+        <p:nvPr/>
+      </p:nvGrpSpPr>
+      <p:grpSpPr>
+        <a:xfrm>
+          <a:off x="0" y="0"/>
+          <a:ext cx="0" cy="0"/>
+          <a:chOff x="0" y="0"/>
+          <a:chExt cx="0" cy="0"/>
+        </a:xfrm>
+      </p:grpSpPr>
+      <p:sp>
+        <p:nvSpPr>
+          <p:cNvPr id="2" name="Slide Image Placeholder 1"/>
+          <p:cNvSpPr>
+            <a:spLocks noGrp="1" noRot="1" noChangeAspect="1"/>
+          </p:cNvSpPr>
+          <p:nvPr>
+            <p:ph type="sldImg"/>
+          </p:nvPr>
+        </p:nvSpPr>
+        <p:spPr/>
+      </p:sp>
+      <p:sp>
+        <p:nvSpPr>
+          <p:cNvPr id="3" name="Notes Placeholder 2"/>
+          <p:cNvSpPr>
+            <a:spLocks noGrp="1"/>
+          </p:cNvSpPr>
+          <p:nvPr>
+            <p:ph type="body" idx="1"/>
+          </p:nvPr>
+        </p:nvSpPr>
+        <p:spPr/>
+        <p:txBody>
+          <a:bodyPr/>
+          <a:lstStyle/>
+          <a:p>
+            <a:r>
+              <a:rPr lang="en-US" dirty="0"/>
+              <a:t>Negative binomial distribution</a:t>
+            </a:r>
+          </a:p>
+        </p:txBody>
+      </p:sp>
+      <p:sp>
+        <p:nvSpPr>
+          <p:cNvPr id="4" name="Slide Number Placeholder 3"/>
+          <p:cNvSpPr>
+            <a:spLocks noGrp="1"/>
+          </p:cNvSpPr>
+          <p:nvPr>
+            <p:ph type="sldNum" sz="quarter" idx="5"/>
+          </p:nvPr>
+        </p:nvSpPr>
+        <p:spPr/>
+        <p:txBody>
+          <a:bodyPr/>
+          <a:lstStyle/>
+          <a:p>
+            <a:fld id="{FC1567E7-98C2-344B-B05F-1D106CF2EAB3}" type="slidenum">
+              <a:rPr lang="en-US" smtClean="0"/>
+              <a:t>5</a:t>
+            </a:fld>
+            <a:endParaRPr lang="en-US"/>
+          </a:p>
+        </p:txBody>
+      </p:sp>
+    </p:spTree>
+    <p:extLst>
+      <p:ext uri="{BB962C8B-B14F-4D97-AF65-F5344CB8AC3E}">
+        <p14:creationId xmlns:p14="http://schemas.microsoft.com/office/powerpoint/2010/main" val="3098134195"/>
+      </p:ext>
+    </p:extLst>
+  </p:cSld>
+  <p:clrMapOvr>
+    <a:masterClrMapping/>
+  </p:clrMapOvr>
+</p:notes>
+</file>
+
+<file path=ppt/notesSlides/notesSlide5.xml><?xml version="1.0" encoding="utf-8"?>
+<p:notes xmlns:a="http://schemas.openxmlformats.org/drawingml/2006/main" xmlns:r="http://schemas.openxmlformats.org/officeDocument/2006/relationships" xmlns:p="http://schemas.openxmlformats.org/presentationml/2006/main">
+  <p:cSld>
+    <p:spTree>
+      <p:nvGrpSpPr>
+        <p:cNvPr id="1" name=""/>
+        <p:cNvGrpSpPr/>
+        <p:nvPr/>
+      </p:nvGrpSpPr>
+      <p:grpSpPr>
+        <a:xfrm>
+          <a:off x="0" y="0"/>
+          <a:ext cx="0" cy="0"/>
+          <a:chOff x="0" y="0"/>
+          <a:chExt cx="0" cy="0"/>
+        </a:xfrm>
+      </p:grpSpPr>
+      <p:sp>
+        <p:nvSpPr>
+          <p:cNvPr id="2" name="Slide Image Placeholder 1"/>
+          <p:cNvSpPr>
+            <a:spLocks noGrp="1" noRot="1" noChangeAspect="1"/>
+          </p:cNvSpPr>
+          <p:nvPr>
+            <p:ph type="sldImg"/>
+          </p:nvPr>
+        </p:nvSpPr>
+        <p:spPr/>
+      </p:sp>
+      <p:sp>
+        <p:nvSpPr>
+          <p:cNvPr id="3" name="Notes Placeholder 2"/>
+          <p:cNvSpPr>
+            <a:spLocks noGrp="1"/>
+          </p:cNvSpPr>
+          <p:nvPr>
+            <p:ph type="body" idx="1"/>
+          </p:nvPr>
+        </p:nvSpPr>
+        <p:spPr/>
+        <p:txBody>
+          <a:bodyPr/>
+          <a:lstStyle/>
+          <a:p>
+            <a:r>
+              <a:rPr lang="en-US" dirty="0"/>
+              <a:t>Different total amounts of worms, different rates to a “peak” infection, and sex effects</a:t>
+            </a:r>
+          </a:p>
+        </p:txBody>
+      </p:sp>
+      <p:sp>
+        <p:nvSpPr>
+          <p:cNvPr id="4" name="Slide Number Placeholder 3"/>
+          <p:cNvSpPr>
+            <a:spLocks noGrp="1"/>
+          </p:cNvSpPr>
+          <p:nvPr>
+            <p:ph type="sldNum" sz="quarter" idx="5"/>
+          </p:nvPr>
+        </p:nvSpPr>
+        <p:spPr/>
+        <p:txBody>
+          <a:bodyPr/>
+          <a:lstStyle/>
+          <a:p>
+            <a:fld id="{FC1567E7-98C2-344B-B05F-1D106CF2EAB3}" type="slidenum">
+              <a:rPr lang="en-US" smtClean="0"/>
+              <a:t>6</a:t>
+            </a:fld>
+            <a:endParaRPr lang="en-US"/>
+          </a:p>
+        </p:txBody>
+      </p:sp>
+    </p:spTree>
+    <p:extLst>
+      <p:ext uri="{BB962C8B-B14F-4D97-AF65-F5344CB8AC3E}">
+        <p14:creationId xmlns:p14="http://schemas.microsoft.com/office/powerpoint/2010/main" val="64218895"/>
+      </p:ext>
+    </p:extLst>
+  </p:cSld>
+  <p:clrMapOvr>
+    <a:masterClrMapping/>
+  </p:clrMapOvr>
+</p:notes>
+</file>
+
+<file path=ppt/notesSlides/notesSlide6.xml><?xml version="1.0" encoding="utf-8"?>
+<p:notes xmlns:a="http://schemas.openxmlformats.org/drawingml/2006/main" xmlns:r="http://schemas.openxmlformats.org/officeDocument/2006/relationships" xmlns:p="http://schemas.openxmlformats.org/presentationml/2006/main">
+  <p:cSld>
+    <p:spTree>
+      <p:nvGrpSpPr>
+        <p:cNvPr id="1" name=""/>
+        <p:cNvGrpSpPr/>
+        <p:nvPr/>
+      </p:nvGrpSpPr>
+      <p:grpSpPr>
+        <a:xfrm>
+          <a:off x="0" y="0"/>
+          <a:ext cx="0" cy="0"/>
+          <a:chOff x="0" y="0"/>
+          <a:chExt cx="0" cy="0"/>
+        </a:xfrm>
+      </p:grpSpPr>
+      <p:sp>
+        <p:nvSpPr>
+          <p:cNvPr id="2" name="Slide Image Placeholder 1"/>
+          <p:cNvSpPr>
+            <a:spLocks noGrp="1" noRot="1" noChangeAspect="1"/>
+          </p:cNvSpPr>
+          <p:nvPr>
+            <p:ph type="sldImg"/>
+          </p:nvPr>
+        </p:nvSpPr>
+        <p:spPr/>
+      </p:sp>
+      <p:sp>
+        <p:nvSpPr>
+          <p:cNvPr id="3" name="Notes Placeholder 2"/>
+          <p:cNvSpPr>
+            <a:spLocks noGrp="1"/>
+          </p:cNvSpPr>
+          <p:nvPr>
+            <p:ph type="body" idx="1"/>
+          </p:nvPr>
+        </p:nvSpPr>
+        <p:spPr/>
+        <p:txBody>
+          <a:bodyPr/>
+          <a:lstStyle/>
+          <a:p>
+            <a:endParaRPr lang="en-US" dirty="0"/>
+          </a:p>
+        </p:txBody>
+      </p:sp>
+      <p:sp>
+        <p:nvSpPr>
+          <p:cNvPr id="4" name="Slide Number Placeholder 3"/>
+          <p:cNvSpPr>
+            <a:spLocks noGrp="1"/>
+          </p:cNvSpPr>
+          <p:nvPr>
+            <p:ph type="sldNum" sz="quarter" idx="5"/>
+          </p:nvPr>
+        </p:nvSpPr>
+        <p:spPr/>
+        <p:txBody>
+          <a:bodyPr/>
+          <a:lstStyle/>
+          <a:p>
+            <a:fld id="{FC1567E7-98C2-344B-B05F-1D106CF2EAB3}" type="slidenum">
+              <a:rPr lang="en-US" smtClean="0"/>
+              <a:t>8</a:t>
+            </a:fld>
+            <a:endParaRPr lang="en-US"/>
+          </a:p>
+        </p:txBody>
+      </p:sp>
+    </p:spTree>
+    <p:extLst>
+      <p:ext uri="{BB962C8B-B14F-4D97-AF65-F5344CB8AC3E}">
+        <p14:creationId xmlns:p14="http://schemas.microsoft.com/office/powerpoint/2010/main" val="3379047733"/>
       </p:ext>
     </p:extLst>
   </p:cSld>
@@ -3990,10 +4244,10 @@
       </p:grpSpPr>
       <p:pic>
         <p:nvPicPr>
-          <p:cNvPr id="22" name="Picture 21">
-            <a:extLst>
-              <a:ext uri="{FF2B5EF4-FFF2-40B4-BE49-F238E27FC236}">
-                <a16:creationId xmlns:a16="http://schemas.microsoft.com/office/drawing/2014/main" id="{B26CA81A-74A6-4142-9D7C-4F4D4EF2FD92}"/>
+          <p:cNvPr id="15" name="Picture 14">
+            <a:extLst>
+              <a:ext uri="{FF2B5EF4-FFF2-40B4-BE49-F238E27FC236}">
+                <a16:creationId xmlns:a16="http://schemas.microsoft.com/office/drawing/2014/main" id="{290EE067-C466-5556-AF90-DE0183098096}"/>
               </a:ext>
             </a:extLst>
           </p:cNvPr>
@@ -4010,12 +4264,52 @@
         </p:blipFill>
         <p:spPr>
           <a:xfrm>
-            <a:off x="8978225" y="358376"/>
+            <a:off x="-10542" y="-651164"/>
+            <a:ext cx="12214220" cy="7523019"/>
+          </a:xfrm>
+          <a:prstGeom prst="rect">
+            <a:avLst/>
+          </a:prstGeom>
+        </p:spPr>
+      </p:pic>
+      <p:pic>
+        <p:nvPicPr>
+          <p:cNvPr id="22" name="Picture 21">
+            <a:extLst>
+              <a:ext uri="{FF2B5EF4-FFF2-40B4-BE49-F238E27FC236}">
+                <a16:creationId xmlns:a16="http://schemas.microsoft.com/office/drawing/2014/main" id="{B26CA81A-74A6-4142-9D7C-4F4D4EF2FD92}"/>
+              </a:ext>
+            </a:extLst>
+          </p:cNvPr>
+          <p:cNvPicPr>
+            <a:picLocks noChangeAspect="1"/>
+          </p:cNvPicPr>
+          <p:nvPr/>
+        </p:nvPicPr>
+        <p:blipFill>
+          <a:blip r:embed="rId4"/>
+          <a:stretch>
+            <a:fillRect/>
+          </a:stretch>
+        </p:blipFill>
+        <p:spPr>
+          <a:xfrm>
+            <a:off x="457680" y="136704"/>
             <a:ext cx="2815809" cy="900030"/>
           </a:xfrm>
           <a:prstGeom prst="rect">
             <a:avLst/>
           </a:prstGeom>
+          <a:ln w="38100" cap="sq">
+            <a:noFill/>
+            <a:prstDash val="solid"/>
+            <a:miter lim="800000"/>
+          </a:ln>
+          <a:effectLst>
+            <a:outerShdw dist="38100" dir="2700000" algn="tl" rotWithShape="0">
+              <a:schemeClr val="bg1"/>
+            </a:outerShdw>
+          </a:effectLst>
         </p:spPr>
       </p:pic>
       <p:sp>
@@ -4334,7 +4628,132 @@
 </p:sld>
 </file>
 
-<file path=ppt/slides/slide2.xml><?xml version="1.0" encoding="utf-8"?>
+<file path=ppt/slides/slide10.xml><?xml version="1.0" encoding="utf-8"?>
+<p:sld xmlns:a="http://schemas.openxmlformats.org/drawingml/2006/main" xmlns:r="http://schemas.openxmlformats.org/officeDocument/2006/relationships" xmlns:p="http://schemas.openxmlformats.org/presentationml/2006/main">
+  <p:cSld>
+    <p:spTree>
+      <p:nvGrpSpPr>
+        <p:cNvPr id="1" name=""/>
+        <p:cNvGrpSpPr/>
+        <p:nvPr/>
+      </p:nvGrpSpPr>
+      <p:grpSpPr>
+        <a:xfrm>
+          <a:off x="0" y="0"/>
+          <a:ext cx="0" cy="0"/>
+          <a:chOff x="0" y="0"/>
+          <a:chExt cx="0" cy="0"/>
+        </a:xfrm>
+      </p:grpSpPr>
+      <p:pic>
+        <p:nvPicPr>
+          <p:cNvPr id="12" name="Picture 11">
+            <a:extLst>
+              <a:ext uri="{FF2B5EF4-FFF2-40B4-BE49-F238E27FC236}">
+                <a16:creationId xmlns:a16="http://schemas.microsoft.com/office/drawing/2014/main" id="{76D6596A-D3BD-413A-E9A8-4C636DE780CB}"/>
+              </a:ext>
+            </a:extLst>
+          </p:cNvPr>
+          <p:cNvPicPr>
+            <a:picLocks noChangeAspect="1"/>
+          </p:cNvPicPr>
+          <p:nvPr/>
+        </p:nvPicPr>
+        <p:blipFill>
+          <a:blip r:embed="rId2"/>
+          <a:stretch>
+            <a:fillRect/>
+          </a:stretch>
+        </p:blipFill>
+        <p:spPr>
+          <a:xfrm>
+            <a:off x="0" y="263236"/>
+            <a:ext cx="6203157" cy="6175950"/>
+          </a:xfrm>
+          <a:prstGeom prst="rect">
+            <a:avLst/>
+          </a:prstGeom>
+        </p:spPr>
+      </p:pic>
+      <p:pic>
+        <p:nvPicPr>
+          <p:cNvPr id="14" name="Picture 13">
+            <a:extLst>
+              <a:ext uri="{FF2B5EF4-FFF2-40B4-BE49-F238E27FC236}">
+                <a16:creationId xmlns:a16="http://schemas.microsoft.com/office/drawing/2014/main" id="{8E03DE01-3C1C-F9D6-8E27-27487FE0675B}"/>
+              </a:ext>
+            </a:extLst>
+          </p:cNvPr>
+          <p:cNvPicPr>
+            <a:picLocks noChangeAspect="1"/>
+          </p:cNvPicPr>
+          <p:nvPr/>
+        </p:nvPicPr>
+        <p:blipFill>
+          <a:blip r:embed="rId3"/>
+          <a:stretch>
+            <a:fillRect/>
+          </a:stretch>
+        </p:blipFill>
+        <p:spPr>
+          <a:xfrm>
+            <a:off x="6124807" y="263236"/>
+            <a:ext cx="6067193" cy="6040582"/>
+          </a:xfrm>
+          <a:prstGeom prst="rect">
+            <a:avLst/>
+          </a:prstGeom>
+        </p:spPr>
+      </p:pic>
+      <p:sp>
+        <p:nvSpPr>
+          <p:cNvPr id="15" name="TextBox 14">
+            <a:extLst>
+              <a:ext uri="{FF2B5EF4-FFF2-40B4-BE49-F238E27FC236}">
+                <a16:creationId xmlns:a16="http://schemas.microsoft.com/office/drawing/2014/main" id="{81B11B85-2298-A754-510C-2FA702149B39}"/>
+              </a:ext>
+            </a:extLst>
+          </p:cNvPr>
+          <p:cNvSpPr txBox="1"/>
+          <p:nvPr/>
+        </p:nvSpPr>
+        <p:spPr>
+          <a:xfrm>
+            <a:off x="4627418" y="6276038"/>
+            <a:ext cx="2937163" cy="461665"/>
+          </a:xfrm>
+          <a:prstGeom prst="rect">
+            <a:avLst/>
+          </a:prstGeom>
+          <a:noFill/>
+        </p:spPr>
+        <p:txBody>
+          <a:bodyPr wrap="square" rtlCol="0">
+            <a:spAutoFit/>
+          </a:bodyPr>
+          <a:lstStyle/>
+          <a:p>
+            <a:r>
+              <a:rPr lang="en-US" sz="2400" dirty="0"/>
+              <a:t>Control Fish</a:t>
+            </a:r>
+          </a:p>
+        </p:txBody>
+      </p:sp>
+    </p:spTree>
+    <p:extLst>
+      <p:ext uri="{BB962C8B-B14F-4D97-AF65-F5344CB8AC3E}">
+        <p14:creationId xmlns:p14="http://schemas.microsoft.com/office/powerpoint/2010/main" val="560071964"/>
+      </p:ext>
+    </p:extLst>
+  </p:cSld>
+  <p:clrMapOvr>
+    <a:masterClrMapping/>
+  </p:clrMapOvr>
+</p:sld>
+</file>
+
+<file path=ppt/slides/slide11.xml><?xml version="1.0" encoding="utf-8"?>
 <p:sld xmlns:a="http://schemas.openxmlformats.org/drawingml/2006/main" xmlns:r="http://schemas.openxmlformats.org/officeDocument/2006/relationships" xmlns:p="http://schemas.openxmlformats.org/presentationml/2006/main" show="0">
   <p:cSld>
     <p:spTree>
@@ -4356,7 +4775,7 @@
           <p:cNvPr id="2" name="Picture 1">
             <a:extLst>
               <a:ext uri="{FF2B5EF4-FFF2-40B4-BE49-F238E27FC236}">
-                <a16:creationId xmlns:a16="http://schemas.microsoft.com/office/drawing/2014/main" id="{ECD7E4C0-DE2A-AEEA-802A-02EBFFDFA7A6}"/>
+                <a16:creationId xmlns:a16="http://schemas.microsoft.com/office/drawing/2014/main" id="{451B4BC3-6763-FD05-7623-C3195EA15801}"/>
               </a:ext>
             </a:extLst>
           </p:cNvPr>
@@ -4372,69 +4791,9 @@
           </a:stretch>
         </p:blipFill>
         <p:spPr>
-          <a:xfrm rot="18170662" flipH="1">
-            <a:off x="1258810" y="2783297"/>
-            <a:ext cx="3237289" cy="1586271"/>
-          </a:xfrm>
-          <a:prstGeom prst="rect">
-            <a:avLst/>
-          </a:prstGeom>
-        </p:spPr>
-      </p:pic>
-      <p:pic>
-        <p:nvPicPr>
-          <p:cNvPr id="3" name="Picture 2">
-            <a:extLst>
-              <a:ext uri="{FF2B5EF4-FFF2-40B4-BE49-F238E27FC236}">
-                <a16:creationId xmlns:a16="http://schemas.microsoft.com/office/drawing/2014/main" id="{FF0F449E-9F09-54B0-CCFE-F072B2FA1A1A}"/>
-              </a:ext>
-            </a:extLst>
-          </p:cNvPr>
-          <p:cNvPicPr>
-            <a:picLocks noChangeAspect="1"/>
-          </p:cNvPicPr>
-          <p:nvPr/>
-        </p:nvPicPr>
-        <p:blipFill>
-          <a:blip r:embed="rId3"/>
-          <a:stretch>
-            <a:fillRect/>
-          </a:stretch>
-        </p:blipFill>
-        <p:spPr>
-          <a:xfrm rot="17100000" flipH="1">
-            <a:off x="3451654" y="2181864"/>
-            <a:ext cx="3237289" cy="1586271"/>
-          </a:xfrm>
-          <a:prstGeom prst="rect">
-            <a:avLst/>
-          </a:prstGeom>
-        </p:spPr>
-      </p:pic>
-      <p:pic>
-        <p:nvPicPr>
-          <p:cNvPr id="4" name="Picture 3">
-            <a:extLst>
-              <a:ext uri="{FF2B5EF4-FFF2-40B4-BE49-F238E27FC236}">
-                <a16:creationId xmlns:a16="http://schemas.microsoft.com/office/drawing/2014/main" id="{30FF4E93-9985-7719-F25B-6F96F09D0952}"/>
-              </a:ext>
-            </a:extLst>
-          </p:cNvPr>
-          <p:cNvPicPr>
-            <a:picLocks noChangeAspect="1"/>
-          </p:cNvPicPr>
-          <p:nvPr/>
-        </p:nvPicPr>
-        <p:blipFill>
-          <a:blip r:embed="rId4"/>
-          <a:stretch>
-            <a:fillRect/>
-          </a:stretch>
-        </p:blipFill>
-        <p:spPr>
-          <a:xfrm rot="3351111">
-            <a:off x="5016645" y="2486042"/>
-            <a:ext cx="3237289" cy="1586271"/>
+          <a:xfrm>
+            <a:off x="1513609" y="819930"/>
+            <a:ext cx="8267700" cy="5218139"/>
           </a:xfrm>
           <a:prstGeom prst="rect">
             <a:avLst/>
@@ -4444,7 +4803,375 @@
     </p:spTree>
     <p:extLst>
       <p:ext uri="{BB962C8B-B14F-4D97-AF65-F5344CB8AC3E}">
-        <p14:creationId xmlns:p14="http://schemas.microsoft.com/office/powerpoint/2010/main" val="3443145765"/>
+        <p14:creationId xmlns:p14="http://schemas.microsoft.com/office/powerpoint/2010/main" val="579427125"/>
+      </p:ext>
+    </p:extLst>
+  </p:cSld>
+  <p:clrMapOvr>
+    <a:masterClrMapping/>
+  </p:clrMapOvr>
+</p:sld>
+</file>
+
+<file path=ppt/slides/slide12.xml><?xml version="1.0" encoding="utf-8"?>
+<p:sld xmlns:a="http://schemas.openxmlformats.org/drawingml/2006/main" xmlns:r="http://schemas.openxmlformats.org/officeDocument/2006/relationships" xmlns:p="http://schemas.openxmlformats.org/presentationml/2006/main">
+  <p:cSld>
+    <p:spTree>
+      <p:nvGrpSpPr>
+        <p:cNvPr id="1" name=""/>
+        <p:cNvGrpSpPr/>
+        <p:nvPr/>
+      </p:nvGrpSpPr>
+      <p:grpSpPr>
+        <a:xfrm>
+          <a:off x="0" y="0"/>
+          <a:ext cx="0" cy="0"/>
+          <a:chOff x="0" y="0"/>
+          <a:chExt cx="0" cy="0"/>
+        </a:xfrm>
+      </p:grpSpPr>
+    </p:spTree>
+    <p:extLst>
+      <p:ext uri="{BB962C8B-B14F-4D97-AF65-F5344CB8AC3E}">
+        <p14:creationId xmlns:p14="http://schemas.microsoft.com/office/powerpoint/2010/main" val="505564410"/>
+      </p:ext>
+    </p:extLst>
+  </p:cSld>
+  <p:clrMapOvr>
+    <a:masterClrMapping/>
+  </p:clrMapOvr>
+</p:sld>
+</file>
+
+<file path=ppt/slides/slide13.xml><?xml version="1.0" encoding="utf-8"?>
+<p:sld xmlns:a="http://schemas.openxmlformats.org/drawingml/2006/main" xmlns:r="http://schemas.openxmlformats.org/officeDocument/2006/relationships" xmlns:p="http://schemas.openxmlformats.org/presentationml/2006/main" show="0">
+  <p:cSld>
+    <p:spTree>
+      <p:nvGrpSpPr>
+        <p:cNvPr id="1" name=""/>
+        <p:cNvGrpSpPr/>
+        <p:nvPr/>
+      </p:nvGrpSpPr>
+      <p:grpSpPr>
+        <a:xfrm>
+          <a:off x="0" y="0"/>
+          <a:ext cx="0" cy="0"/>
+          <a:chOff x="0" y="0"/>
+          <a:chExt cx="0" cy="0"/>
+        </a:xfrm>
+      </p:grpSpPr>
+    </p:spTree>
+    <p:extLst>
+      <p:ext uri="{BB962C8B-B14F-4D97-AF65-F5344CB8AC3E}">
+        <p14:creationId xmlns:p14="http://schemas.microsoft.com/office/powerpoint/2010/main" val="607842329"/>
+      </p:ext>
+    </p:extLst>
+  </p:cSld>
+  <p:clrMapOvr>
+    <a:masterClrMapping/>
+  </p:clrMapOvr>
+</p:sld>
+</file>
+
+<file path=ppt/slides/slide14.xml><?xml version="1.0" encoding="utf-8"?>
+<p:sld xmlns:a="http://schemas.openxmlformats.org/drawingml/2006/main" xmlns:r="http://schemas.openxmlformats.org/officeDocument/2006/relationships" xmlns:p="http://schemas.openxmlformats.org/presentationml/2006/main">
+  <p:cSld>
+    <p:spTree>
+      <p:nvGrpSpPr>
+        <p:cNvPr id="1" name=""/>
+        <p:cNvGrpSpPr/>
+        <p:nvPr/>
+      </p:nvGrpSpPr>
+      <p:grpSpPr>
+        <a:xfrm>
+          <a:off x="0" y="0"/>
+          <a:ext cx="0" cy="0"/>
+          <a:chOff x="0" y="0"/>
+          <a:chExt cx="0" cy="0"/>
+        </a:xfrm>
+      </p:grpSpPr>
+      <p:sp>
+        <p:nvSpPr>
+          <p:cNvPr id="2" name="Title 1">
+            <a:extLst>
+              <a:ext uri="{FF2B5EF4-FFF2-40B4-BE49-F238E27FC236}">
+                <a16:creationId xmlns:a16="http://schemas.microsoft.com/office/drawing/2014/main" id="{7365125B-DFD7-B340-D064-012BC1994517}"/>
+              </a:ext>
+            </a:extLst>
+          </p:cNvPr>
+          <p:cNvSpPr>
+            <a:spLocks noGrp="1"/>
+          </p:cNvSpPr>
+          <p:nvPr>
+            <p:ph type="title"/>
+          </p:nvPr>
+        </p:nvSpPr>
+        <p:spPr/>
+        <p:txBody>
+          <a:bodyPr/>
+          <a:lstStyle/>
+          <a:p>
+            <a:endParaRPr lang="en-US"/>
+          </a:p>
+        </p:txBody>
+      </p:sp>
+      <p:sp>
+        <p:nvSpPr>
+          <p:cNvPr id="3" name="Content Placeholder 2">
+            <a:extLst>
+              <a:ext uri="{FF2B5EF4-FFF2-40B4-BE49-F238E27FC236}">
+                <a16:creationId xmlns:a16="http://schemas.microsoft.com/office/drawing/2014/main" id="{9FDDE015-ED75-5E65-9420-70C0792955D0}"/>
+              </a:ext>
+            </a:extLst>
+          </p:cNvPr>
+          <p:cNvSpPr>
+            <a:spLocks noGrp="1"/>
+          </p:cNvSpPr>
+          <p:nvPr>
+            <p:ph idx="1"/>
+          </p:nvPr>
+        </p:nvSpPr>
+        <p:spPr/>
+        <p:txBody>
+          <a:bodyPr/>
+          <a:lstStyle/>
+          <a:p>
+            <a:endParaRPr lang="en-US"/>
+          </a:p>
+        </p:txBody>
+      </p:sp>
+    </p:spTree>
+    <p:extLst>
+      <p:ext uri="{BB962C8B-B14F-4D97-AF65-F5344CB8AC3E}">
+        <p14:creationId xmlns:p14="http://schemas.microsoft.com/office/powerpoint/2010/main" val="1075763272"/>
+      </p:ext>
+    </p:extLst>
+  </p:cSld>
+  <p:clrMapOvr>
+    <a:masterClrMapping/>
+  </p:clrMapOvr>
+</p:sld>
+</file>
+
+<file path=ppt/slides/slide15.xml><?xml version="1.0" encoding="utf-8"?>
+<p:sld xmlns:a="http://schemas.openxmlformats.org/drawingml/2006/main" xmlns:r="http://schemas.openxmlformats.org/officeDocument/2006/relationships" xmlns:p="http://schemas.openxmlformats.org/presentationml/2006/main" show="0">
+  <p:cSld>
+    <p:spTree>
+      <p:nvGrpSpPr>
+        <p:cNvPr id="1" name=""/>
+        <p:cNvGrpSpPr/>
+        <p:nvPr/>
+      </p:nvGrpSpPr>
+      <p:grpSpPr>
+        <a:xfrm>
+          <a:off x="0" y="0"/>
+          <a:ext cx="0" cy="0"/>
+          <a:chOff x="0" y="0"/>
+          <a:chExt cx="0" cy="0"/>
+        </a:xfrm>
+      </p:grpSpPr>
+    </p:spTree>
+    <p:extLst>
+      <p:ext uri="{BB962C8B-B14F-4D97-AF65-F5344CB8AC3E}">
+        <p14:creationId xmlns:p14="http://schemas.microsoft.com/office/powerpoint/2010/main" val="4172439771"/>
+      </p:ext>
+    </p:extLst>
+  </p:cSld>
+  <p:clrMapOvr>
+    <a:masterClrMapping/>
+  </p:clrMapOvr>
+</p:sld>
+</file>
+
+<file path=ppt/slides/slide16.xml><?xml version="1.0" encoding="utf-8"?>
+<p:sld xmlns:a="http://schemas.openxmlformats.org/drawingml/2006/main" xmlns:r="http://schemas.openxmlformats.org/officeDocument/2006/relationships" xmlns:p="http://schemas.openxmlformats.org/presentationml/2006/main">
+  <p:cSld>
+    <p:spTree>
+      <p:nvGrpSpPr>
+        <p:cNvPr id="1" name=""/>
+        <p:cNvGrpSpPr/>
+        <p:nvPr/>
+      </p:nvGrpSpPr>
+      <p:grpSpPr>
+        <a:xfrm>
+          <a:off x="0" y="0"/>
+          <a:ext cx="0" cy="0"/>
+          <a:chOff x="0" y="0"/>
+          <a:chExt cx="0" cy="0"/>
+        </a:xfrm>
+      </p:grpSpPr>
+      <p:sp>
+        <p:nvSpPr>
+          <p:cNvPr id="2" name="Title 1">
+            <a:extLst>
+              <a:ext uri="{FF2B5EF4-FFF2-40B4-BE49-F238E27FC236}">
+                <a16:creationId xmlns:a16="http://schemas.microsoft.com/office/drawing/2014/main" id="{7365125B-DFD7-B340-D064-012BC1994517}"/>
+              </a:ext>
+            </a:extLst>
+          </p:cNvPr>
+          <p:cNvSpPr>
+            <a:spLocks noGrp="1"/>
+          </p:cNvSpPr>
+          <p:nvPr>
+            <p:ph type="title"/>
+          </p:nvPr>
+        </p:nvSpPr>
+        <p:spPr/>
+        <p:txBody>
+          <a:bodyPr/>
+          <a:lstStyle/>
+          <a:p>
+            <a:endParaRPr lang="en-US"/>
+          </a:p>
+        </p:txBody>
+      </p:sp>
+      <p:sp>
+        <p:nvSpPr>
+          <p:cNvPr id="3" name="Content Placeholder 2">
+            <a:extLst>
+              <a:ext uri="{FF2B5EF4-FFF2-40B4-BE49-F238E27FC236}">
+                <a16:creationId xmlns:a16="http://schemas.microsoft.com/office/drawing/2014/main" id="{9FDDE015-ED75-5E65-9420-70C0792955D0}"/>
+              </a:ext>
+            </a:extLst>
+          </p:cNvPr>
+          <p:cNvSpPr>
+            <a:spLocks noGrp="1"/>
+          </p:cNvSpPr>
+          <p:nvPr>
+            <p:ph idx="1"/>
+          </p:nvPr>
+        </p:nvSpPr>
+        <p:spPr/>
+        <p:txBody>
+          <a:bodyPr/>
+          <a:lstStyle/>
+          <a:p>
+            <a:endParaRPr lang="en-US"/>
+          </a:p>
+        </p:txBody>
+      </p:sp>
+    </p:spTree>
+    <p:extLst>
+      <p:ext uri="{BB962C8B-B14F-4D97-AF65-F5344CB8AC3E}">
+        <p14:creationId xmlns:p14="http://schemas.microsoft.com/office/powerpoint/2010/main" val="3048832226"/>
+      </p:ext>
+    </p:extLst>
+  </p:cSld>
+  <p:clrMapOvr>
+    <a:masterClrMapping/>
+  </p:clrMapOvr>
+</p:sld>
+</file>
+
+<file path=ppt/slides/slide17.xml><?xml version="1.0" encoding="utf-8"?>
+<p:sld xmlns:a="http://schemas.openxmlformats.org/drawingml/2006/main" xmlns:r="http://schemas.openxmlformats.org/officeDocument/2006/relationships" xmlns:p="http://schemas.openxmlformats.org/presentationml/2006/main" show="0">
+  <p:cSld>
+    <p:spTree>
+      <p:nvGrpSpPr>
+        <p:cNvPr id="1" name=""/>
+        <p:cNvGrpSpPr/>
+        <p:nvPr/>
+      </p:nvGrpSpPr>
+      <p:grpSpPr>
+        <a:xfrm>
+          <a:off x="0" y="0"/>
+          <a:ext cx="0" cy="0"/>
+          <a:chOff x="0" y="0"/>
+          <a:chExt cx="0" cy="0"/>
+        </a:xfrm>
+      </p:grpSpPr>
+    </p:spTree>
+    <p:extLst>
+      <p:ext uri="{BB962C8B-B14F-4D97-AF65-F5344CB8AC3E}">
+        <p14:creationId xmlns:p14="http://schemas.microsoft.com/office/powerpoint/2010/main" val="2391717294"/>
+      </p:ext>
+    </p:extLst>
+  </p:cSld>
+  <p:clrMapOvr>
+    <a:masterClrMapping/>
+  </p:clrMapOvr>
+</p:sld>
+</file>
+
+<file path=ppt/slides/slide2.xml><?xml version="1.0" encoding="utf-8"?>
+<p:sld xmlns:a="http://schemas.openxmlformats.org/drawingml/2006/main" xmlns:r="http://schemas.openxmlformats.org/officeDocument/2006/relationships" xmlns:p="http://schemas.openxmlformats.org/presentationml/2006/main">
+  <p:cSld>
+    <p:spTree>
+      <p:nvGrpSpPr>
+        <p:cNvPr id="1" name=""/>
+        <p:cNvGrpSpPr/>
+        <p:nvPr/>
+      </p:nvGrpSpPr>
+      <p:grpSpPr>
+        <a:xfrm>
+          <a:off x="0" y="0"/>
+          <a:ext cx="0" cy="0"/>
+          <a:chOff x="0" y="0"/>
+          <a:chExt cx="0" cy="0"/>
+        </a:xfrm>
+      </p:grpSpPr>
+      <p:sp>
+        <p:nvSpPr>
+          <p:cNvPr id="2" name="Title 1">
+            <a:extLst>
+              <a:ext uri="{FF2B5EF4-FFF2-40B4-BE49-F238E27FC236}">
+                <a16:creationId xmlns:a16="http://schemas.microsoft.com/office/drawing/2014/main" id="{05A991CF-79FC-F468-2601-9F146E2ABF47}"/>
+              </a:ext>
+            </a:extLst>
+          </p:cNvPr>
+          <p:cNvSpPr>
+            <a:spLocks noGrp="1"/>
+          </p:cNvSpPr>
+          <p:nvPr>
+            <p:ph type="title"/>
+          </p:nvPr>
+        </p:nvSpPr>
+        <p:spPr/>
+        <p:txBody>
+          <a:bodyPr/>
+          <a:lstStyle/>
+          <a:p>
+            <a:r>
+              <a:rPr lang="en-US" dirty="0"/>
+              <a:t>Zebrafish live in 28°C water</a:t>
+            </a:r>
+          </a:p>
+        </p:txBody>
+      </p:sp>
+      <p:sp>
+        <p:nvSpPr>
+          <p:cNvPr id="3" name="Content Placeholder 2">
+            <a:extLst>
+              <a:ext uri="{FF2B5EF4-FFF2-40B4-BE49-F238E27FC236}">
+                <a16:creationId xmlns:a16="http://schemas.microsoft.com/office/drawing/2014/main" id="{8AF025AA-3186-768A-EE77-C5397C5A4D4B}"/>
+              </a:ext>
+            </a:extLst>
+          </p:cNvPr>
+          <p:cNvSpPr>
+            <a:spLocks noGrp="1"/>
+          </p:cNvSpPr>
+          <p:nvPr>
+            <p:ph idx="1"/>
+          </p:nvPr>
+        </p:nvSpPr>
+        <p:spPr>
+          <a:xfrm>
+            <a:off x="216816" y="1545996"/>
+            <a:ext cx="5879184" cy="4630967"/>
+          </a:xfrm>
+        </p:spPr>
+        <p:txBody>
+          <a:bodyPr/>
+          <a:lstStyle/>
+          <a:p>
+            <a:endParaRPr lang="en-US" dirty="0"/>
+          </a:p>
+        </p:txBody>
+      </p:sp>
+    </p:spTree>
+    <p:extLst>
+      <p:ext uri="{BB962C8B-B14F-4D97-AF65-F5344CB8AC3E}">
+        <p14:creationId xmlns:p14="http://schemas.microsoft.com/office/powerpoint/2010/main" val="4075418784"/>
       </p:ext>
     </p:extLst>
   </p:cSld>
@@ -7170,7 +7897,7 @@
           <p:nvPr/>
         </p:nvPicPr>
         <p:blipFill>
-          <a:blip r:embed="rId2"/>
+          <a:blip r:embed="rId3"/>
           <a:stretch>
             <a:fillRect/>
           </a:stretch>
@@ -7258,7 +7985,7 @@
           <p:nvPr/>
         </p:nvPicPr>
         <p:blipFill>
-          <a:blip r:embed="rId2"/>
+          <a:blip r:embed="rId3"/>
           <a:stretch>
             <a:fillRect/>
           </a:stretch>
@@ -7288,7 +8015,7 @@
           <p:nvPr/>
         </p:nvPicPr>
         <p:blipFill>
-          <a:blip r:embed="rId3"/>
+          <a:blip r:embed="rId4"/>
           <a:stretch>
             <a:fillRect/>
           </a:stretch>
@@ -7318,7 +8045,7 @@
           <p:nvPr/>
         </p:nvPicPr>
         <p:blipFill>
-          <a:blip r:embed="rId4"/>
+          <a:blip r:embed="rId5"/>
           <a:stretch>
             <a:fillRect/>
           </a:stretch>
@@ -7368,7 +8095,7 @@
           <p:cNvPr id="2" name="Title 1">
             <a:extLst>
               <a:ext uri="{FF2B5EF4-FFF2-40B4-BE49-F238E27FC236}">
-                <a16:creationId xmlns:a16="http://schemas.microsoft.com/office/drawing/2014/main" id="{37D4F6FB-5A70-09B9-A5A8-E99DE66824B9}"/>
+                <a16:creationId xmlns:a16="http://schemas.microsoft.com/office/drawing/2014/main" id="{1473C536-163A-4E94-3188-E5397D0FDBB7}"/>
               </a:ext>
             </a:extLst>
           </p:cNvPr>
@@ -7386,41 +8113,182 @@
           <a:p>
             <a:r>
               <a:rPr lang="en-US" dirty="0"/>
-              <a:t>Trend holds when worm count is </a:t>
+              <a:t>Microbiome</a:t>
+            </a:r>
+          </a:p>
+        </p:txBody>
+      </p:sp>
+      <p:sp>
+        <p:nvSpPr>
+          <p:cNvPr id="5" name="Content Placeholder 4">
+            <a:extLst>
+              <a:ext uri="{FF2B5EF4-FFF2-40B4-BE49-F238E27FC236}">
+                <a16:creationId xmlns:a16="http://schemas.microsoft.com/office/drawing/2014/main" id="{6221BE6E-84BA-B640-E8A5-EEFA403B0D88}"/>
+              </a:ext>
+            </a:extLst>
+          </p:cNvPr>
+          <p:cNvSpPr>
+            <a:spLocks noGrp="1"/>
+          </p:cNvSpPr>
+          <p:nvPr>
+            <p:ph idx="1"/>
+          </p:nvPr>
+        </p:nvSpPr>
+        <p:spPr/>
+        <p:txBody>
+          <a:bodyPr/>
+          <a:lstStyle/>
+          <a:p>
+            <a:endParaRPr lang="en-US"/>
+          </a:p>
+        </p:txBody>
+      </p:sp>
+    </p:spTree>
+    <p:extLst>
+      <p:ext uri="{BB962C8B-B14F-4D97-AF65-F5344CB8AC3E}">
+        <p14:creationId xmlns:p14="http://schemas.microsoft.com/office/powerpoint/2010/main" val="1562190930"/>
+      </p:ext>
+    </p:extLst>
+  </p:cSld>
+  <p:clrMapOvr>
+    <a:masterClrMapping/>
+  </p:clrMapOvr>
+</p:sld>
+</file>
+
+<file path=ppt/slides/slide8.xml><?xml version="1.0" encoding="utf-8"?>
+<p:sld xmlns:a="http://schemas.openxmlformats.org/drawingml/2006/main" xmlns:r="http://schemas.openxmlformats.org/officeDocument/2006/relationships" xmlns:p="http://schemas.openxmlformats.org/presentationml/2006/main">
+  <p:cSld>
+    <p:spTree>
+      <p:nvGrpSpPr>
+        <p:cNvPr id="1" name=""/>
+        <p:cNvGrpSpPr/>
+        <p:nvPr/>
+      </p:nvGrpSpPr>
+      <p:grpSpPr>
+        <a:xfrm>
+          <a:off x="0" y="0"/>
+          <a:ext cx="0" cy="0"/>
+          <a:chOff x="0" y="0"/>
+          <a:chExt cx="0" cy="0"/>
+        </a:xfrm>
+      </p:grpSpPr>
+      <p:sp>
+        <p:nvSpPr>
+          <p:cNvPr id="2" name="Title 1">
+            <a:extLst>
+              <a:ext uri="{FF2B5EF4-FFF2-40B4-BE49-F238E27FC236}">
+                <a16:creationId xmlns:a16="http://schemas.microsoft.com/office/drawing/2014/main" id="{A667CBFD-8765-4F17-4D31-F7AAE4BBDC2F}"/>
+              </a:ext>
+            </a:extLst>
+          </p:cNvPr>
+          <p:cNvSpPr>
+            <a:spLocks noGrp="1"/>
+          </p:cNvSpPr>
+          <p:nvPr>
+            <p:ph type="title"/>
+          </p:nvPr>
+        </p:nvSpPr>
+        <p:spPr/>
+        <p:txBody>
+          <a:bodyPr/>
+          <a:lstStyle/>
+          <a:p>
+            <a:r>
+              <a:rPr lang="en-US" dirty="0"/>
+              <a:t>Higher temperatures associate </a:t>
             </a:r>
             <a:br>
               <a:rPr lang="en-US" dirty="0"/>
             </a:br>
             <a:r>
               <a:rPr lang="en-US" dirty="0"/>
-              <a:t>normalized to number of fish</a:t>
-            </a:r>
-          </a:p>
-        </p:txBody>
-      </p:sp>
-      <p:sp>
-        <p:nvSpPr>
-          <p:cNvPr id="11" name="TextBox 10">
-            <a:extLst>
-              <a:ext uri="{FF2B5EF4-FFF2-40B4-BE49-F238E27FC236}">
-                <a16:creationId xmlns:a16="http://schemas.microsoft.com/office/drawing/2014/main" id="{90A256BF-DBD3-11A6-FE74-6F2CAB3DBCAE}"/>
-              </a:ext>
-            </a:extLst>
-          </p:cNvPr>
-          <p:cNvSpPr txBox="1"/>
+              <a:t>with higher alpha diversity</a:t>
+            </a:r>
+          </a:p>
+        </p:txBody>
+      </p:sp>
+      <p:pic>
+        <p:nvPicPr>
+          <p:cNvPr id="5" name="Picture 4">
+            <a:extLst>
+              <a:ext uri="{FF2B5EF4-FFF2-40B4-BE49-F238E27FC236}">
+                <a16:creationId xmlns:a16="http://schemas.microsoft.com/office/drawing/2014/main" id="{822F1FD8-5431-1786-BC33-7428E550CD11}"/>
+              </a:ext>
+            </a:extLst>
+          </p:cNvPr>
+          <p:cNvPicPr>
+            <a:picLocks noChangeAspect="1"/>
+          </p:cNvPicPr>
           <p:nvPr/>
-        </p:nvSpPr>
+        </p:nvPicPr>
+        <p:blipFill>
+          <a:blip r:embed="rId3"/>
+          <a:stretch>
+            <a:fillRect/>
+          </a:stretch>
+        </p:blipFill>
         <p:spPr>
           <a:xfrm>
-            <a:off x="6412674" y="4986440"/>
-            <a:ext cx="5565569" cy="646331"/>
+            <a:off x="1970632" y="1325563"/>
+            <a:ext cx="8250735" cy="5091882"/>
           </a:xfrm>
           <a:prstGeom prst="rect">
             <a:avLst/>
           </a:prstGeom>
-          <a:solidFill>
-            <a:schemeClr val="bg1"/>
-          </a:solidFill>
+        </p:spPr>
+      </p:pic>
+      <p:pic>
+        <p:nvPicPr>
+          <p:cNvPr id="6" name="Picture 5">
+            <a:extLst>
+              <a:ext uri="{FF2B5EF4-FFF2-40B4-BE49-F238E27FC236}">
+                <a16:creationId xmlns:a16="http://schemas.microsoft.com/office/drawing/2014/main" id="{4B148383-1F64-C088-4406-E44067A11FC3}"/>
+              </a:ext>
+            </a:extLst>
+          </p:cNvPr>
+          <p:cNvPicPr>
+            <a:picLocks noChangeAspect="1"/>
+          </p:cNvPicPr>
+          <p:nvPr/>
+        </p:nvPicPr>
+        <p:blipFill>
+          <a:blip r:embed="rId4"/>
+          <a:stretch>
+            <a:fillRect/>
+          </a:stretch>
+        </p:blipFill>
+        <p:spPr>
+          <a:xfrm>
+            <a:off x="8763801" y="5562600"/>
+            <a:ext cx="3314700" cy="1295400"/>
+          </a:xfrm>
+          <a:prstGeom prst="rect">
+            <a:avLst/>
+          </a:prstGeom>
+        </p:spPr>
+      </p:pic>
+      <p:sp>
+        <p:nvSpPr>
+          <p:cNvPr id="7" name="TextBox 6">
+            <a:extLst>
+              <a:ext uri="{FF2B5EF4-FFF2-40B4-BE49-F238E27FC236}">
+                <a16:creationId xmlns:a16="http://schemas.microsoft.com/office/drawing/2014/main" id="{CC1C13C2-0596-FA1B-3602-789AEA5C019C}"/>
+              </a:ext>
+            </a:extLst>
+          </p:cNvPr>
+          <p:cNvSpPr txBox="1"/>
+          <p:nvPr/>
+        </p:nvSpPr>
+        <p:spPr>
+          <a:xfrm>
+            <a:off x="210480" y="6176057"/>
+            <a:ext cx="2937163" cy="461665"/>
+          </a:xfrm>
+          <a:prstGeom prst="rect">
+            <a:avLst/>
+          </a:prstGeom>
+          <a:noFill/>
         </p:spPr>
         <p:txBody>
           <a:bodyPr wrap="square" rtlCol="0">
@@ -7428,23 +8296,49 @@
           </a:bodyPr>
           <a:lstStyle/>
           <a:p>
-            <a:pPr algn="r"/>
-            <a:br>
-              <a:rPr lang="en-US" dirty="0"/>
-            </a:br>
-            <a:r>
-              <a:rPr lang="en-US" dirty="0"/>
-              <a:t>Number = Total worms / Num fish</a:t>
-            </a:r>
-          </a:p>
-        </p:txBody>
-      </p:sp>
+            <a:r>
+              <a:rPr lang="en-US" sz="2400" dirty="0"/>
+              <a:t>Control Fish</a:t>
+            </a:r>
+          </a:p>
+        </p:txBody>
+      </p:sp>
+    </p:spTree>
+    <p:extLst>
+      <p:ext uri="{BB962C8B-B14F-4D97-AF65-F5344CB8AC3E}">
+        <p14:creationId xmlns:p14="http://schemas.microsoft.com/office/powerpoint/2010/main" val="3504271815"/>
+      </p:ext>
+    </p:extLst>
+  </p:cSld>
+  <p:clrMapOvr>
+    <a:masterClrMapping/>
+  </p:clrMapOvr>
+</p:sld>
+</file>
+
+<file path=ppt/slides/slide9.xml><?xml version="1.0" encoding="utf-8"?>
+<p:sld xmlns:a="http://schemas.openxmlformats.org/drawingml/2006/main" xmlns:r="http://schemas.openxmlformats.org/officeDocument/2006/relationships" xmlns:p="http://schemas.openxmlformats.org/presentationml/2006/main" show="0">
+  <p:cSld>
+    <p:spTree>
+      <p:nvGrpSpPr>
+        <p:cNvPr id="1" name=""/>
+        <p:cNvGrpSpPr/>
+        <p:nvPr/>
+      </p:nvGrpSpPr>
+      <p:grpSpPr>
+        <a:xfrm>
+          <a:off x="0" y="0"/>
+          <a:ext cx="0" cy="0"/>
+          <a:chOff x="0" y="0"/>
+          <a:chExt cx="0" cy="0"/>
+        </a:xfrm>
+      </p:grpSpPr>
       <p:pic>
         <p:nvPicPr>
-          <p:cNvPr id="13" name="Picture 12">
-            <a:extLst>
-              <a:ext uri="{FF2B5EF4-FFF2-40B4-BE49-F238E27FC236}">
-                <a16:creationId xmlns:a16="http://schemas.microsoft.com/office/drawing/2014/main" id="{320BFF54-DB82-4BA3-DF3B-BDEB191FCA1F}"/>
+          <p:cNvPr id="2" name="Picture 1">
+            <a:extLst>
+              <a:ext uri="{FF2B5EF4-FFF2-40B4-BE49-F238E27FC236}">
+                <a16:creationId xmlns:a16="http://schemas.microsoft.com/office/drawing/2014/main" id="{3A441819-E735-B2AE-C56B-10FC3C28EC90}"/>
               </a:ext>
             </a:extLst>
           </p:cNvPr>
@@ -7461,78 +8355,99 @@
         </p:blipFill>
         <p:spPr>
           <a:xfrm>
-            <a:off x="1962151" y="5220300"/>
-            <a:ext cx="6259100" cy="1646538"/>
+            <a:off x="154420" y="865533"/>
+            <a:ext cx="5941580" cy="4849841"/>
           </a:xfrm>
           <a:prstGeom prst="rect">
             <a:avLst/>
           </a:prstGeom>
         </p:spPr>
       </p:pic>
-      <p:pic>
-        <p:nvPicPr>
-          <p:cNvPr id="15" name="Picture 14">
-            <a:extLst>
-              <a:ext uri="{FF2B5EF4-FFF2-40B4-BE49-F238E27FC236}">
-                <a16:creationId xmlns:a16="http://schemas.microsoft.com/office/drawing/2014/main" id="{C96620DC-B997-100F-5B52-E09E0F7CEBB2}"/>
-              </a:ext>
-            </a:extLst>
-          </p:cNvPr>
-          <p:cNvPicPr>
-            <a:picLocks noChangeAspect="1"/>
-          </p:cNvPicPr>
+      <p:grpSp>
+        <p:nvGrpSpPr>
+          <p:cNvPr id="6" name="Group 5">
+            <a:extLst>
+              <a:ext uri="{FF2B5EF4-FFF2-40B4-BE49-F238E27FC236}">
+                <a16:creationId xmlns:a16="http://schemas.microsoft.com/office/drawing/2014/main" id="{03CBC376-1190-0615-BF0E-EFB6818CC4AA}"/>
+              </a:ext>
+            </a:extLst>
+          </p:cNvPr>
+          <p:cNvGrpSpPr/>
           <p:nvPr/>
-        </p:nvPicPr>
-        <p:blipFill>
-          <a:blip r:embed="rId3"/>
-          <a:stretch>
-            <a:fillRect/>
-          </a:stretch>
-        </p:blipFill>
-        <p:spPr>
+        </p:nvGrpSpPr>
+        <p:grpSpPr>
           <a:xfrm>
-            <a:off x="179705" y="1335241"/>
-            <a:ext cx="5916295" cy="3651199"/>
+            <a:off x="5745595" y="945776"/>
+            <a:ext cx="6366251" cy="4485206"/>
+            <a:chOff x="5745595" y="945776"/>
+            <a:chExt cx="6366251" cy="4485206"/>
           </a:xfrm>
-          <a:prstGeom prst="rect">
-            <a:avLst/>
-          </a:prstGeom>
-        </p:spPr>
-      </p:pic>
-      <p:pic>
-        <p:nvPicPr>
-          <p:cNvPr id="16" name="Picture 15">
-            <a:extLst>
-              <a:ext uri="{FF2B5EF4-FFF2-40B4-BE49-F238E27FC236}">
-                <a16:creationId xmlns:a16="http://schemas.microsoft.com/office/drawing/2014/main" id="{1E6773D6-2AC2-186A-E006-6C5817FDD9DC}"/>
-              </a:ext>
-            </a:extLst>
-          </p:cNvPr>
-          <p:cNvPicPr>
-            <a:picLocks noChangeAspect="1"/>
-          </p:cNvPicPr>
-          <p:nvPr/>
-        </p:nvPicPr>
-        <p:blipFill>
-          <a:blip r:embed="rId4"/>
-          <a:stretch>
-            <a:fillRect/>
-          </a:stretch>
-        </p:blipFill>
-        <p:spPr>
-          <a:xfrm>
-            <a:off x="6096000" y="1335241"/>
-            <a:ext cx="5916295" cy="3651199"/>
-          </a:xfrm>
-          <a:prstGeom prst="rect">
-            <a:avLst/>
-          </a:prstGeom>
-        </p:spPr>
-      </p:pic>
+        </p:grpSpPr>
+        <p:pic>
+          <p:nvPicPr>
+            <p:cNvPr id="4" name="Picture 3">
+              <a:extLst>
+                <a:ext uri="{FF2B5EF4-FFF2-40B4-BE49-F238E27FC236}">
+                  <a16:creationId xmlns:a16="http://schemas.microsoft.com/office/drawing/2014/main" id="{B4708F78-34E4-BCC3-2DA9-9840CF746DBE}"/>
+                </a:ext>
+              </a:extLst>
+            </p:cNvPr>
+            <p:cNvPicPr>
+              <a:picLocks noChangeAspect="1"/>
+            </p:cNvPicPr>
+            <p:nvPr/>
+          </p:nvPicPr>
+          <p:blipFill>
+            <a:blip r:embed="rId3"/>
+            <a:stretch>
+              <a:fillRect/>
+            </a:stretch>
+          </p:blipFill>
+          <p:spPr>
+            <a:xfrm>
+              <a:off x="5745595" y="1503218"/>
+              <a:ext cx="6366251" cy="3927764"/>
+            </a:xfrm>
+            <a:prstGeom prst="rect">
+              <a:avLst/>
+            </a:prstGeom>
+          </p:spPr>
+        </p:pic>
+        <p:pic>
+          <p:nvPicPr>
+            <p:cNvPr id="5" name="Picture 4">
+              <a:extLst>
+                <a:ext uri="{FF2B5EF4-FFF2-40B4-BE49-F238E27FC236}">
+                  <a16:creationId xmlns:a16="http://schemas.microsoft.com/office/drawing/2014/main" id="{02209750-4B7F-858E-20EF-FC1BBEED5737}"/>
+                </a:ext>
+              </a:extLst>
+            </p:cNvPr>
+            <p:cNvPicPr>
+              <a:picLocks noChangeAspect="1"/>
+            </p:cNvPicPr>
+            <p:nvPr/>
+          </p:nvPicPr>
+          <p:blipFill>
+            <a:blip r:embed="rId4"/>
+            <a:stretch>
+              <a:fillRect/>
+            </a:stretch>
+          </p:blipFill>
+          <p:spPr>
+            <a:xfrm>
+              <a:off x="5848928" y="945776"/>
+              <a:ext cx="6188652" cy="494454"/>
+            </a:xfrm>
+            <a:prstGeom prst="rect">
+              <a:avLst/>
+            </a:prstGeom>
+          </p:spPr>
+        </p:pic>
+      </p:grpSp>
     </p:spTree>
     <p:extLst>
       <p:ext uri="{BB962C8B-B14F-4D97-AF65-F5344CB8AC3E}">
-        <p14:creationId xmlns:p14="http://schemas.microsoft.com/office/powerpoint/2010/main" val="3414500991"/>
+        <p14:creationId xmlns:p14="http://schemas.microsoft.com/office/powerpoint/2010/main" val="2378340687"/>
       </p:ext>
     </p:extLst>
   </p:cSld>

</xml_diff>